<commit_message>
Added github link to references
</commit_message>
<xml_diff>
--- a/slides/junit5_basics.pptx
+++ b/slides/junit5_basics.pptx
@@ -239,7 +239,7 @@
           <a:p>
             <a:fld id="{3FDC14FC-A894-4869-A797-1EC82735D106}" type="datetimeFigureOut">
               <a:rPr lang="en-US" smtClean="0"/>
-              <a:t>9/14/2020</a:t>
+              <a:t>9/16/2020</a:t>
             </a:fld>
             <a:endParaRPr lang="en-US"/>
           </a:p>
@@ -404,7 +404,7 @@
           <a:p>
             <a:fld id="{B4F99C05-63F9-4248-8E20-3ACD9DF9DE7F}" type="datetimeFigureOut">
               <a:rPr lang="en-US" smtClean="0"/>
-              <a:t>9/14/2020</a:t>
+              <a:t>9/16/2020</a:t>
             </a:fld>
             <a:endParaRPr lang="en-US"/>
           </a:p>
@@ -10681,7 +10681,7 @@
           </a:ln>
           <a:extLst>
             <a:ext uri="{C572A759-6A51-4108-AA02-DFA0A04FC94B}">
-              <ma14:wrappingTextBoxFlag xmlns:ma14="http://schemas.microsoft.com/office/mac/drawingml/2011/main" xmlns="" val="1"/>
+              <ma14:wrappingTextBoxFlag xmlns="" xmlns:ma14="http://schemas.microsoft.com/office/mac/drawingml/2011/main" val="1"/>
             </a:ext>
           </a:extLst>
         </p:spPr>
@@ -11973,7 +11973,7 @@
           <a:p>
             <a:fld id="{09AE1A03-4B70-45D5-96E7-D979506502C0}" type="datetimeFigureOut">
               <a:rPr lang="en-US" smtClean="0"/>
-              <a:t>9/14/2020</a:t>
+              <a:t>9/16/2020</a:t>
             </a:fld>
             <a:endParaRPr lang="en-US"/>
           </a:p>
@@ -30586,6 +30586,26 @@
                   </a:extLst>
                 </a:hlinkClick>
               </a:rPr>
+              <a:t>https://github.com/gitaroktato/junit5-lectures</a:t>
+            </a:r>
+          </a:p>
+          <a:p>
+            <a:pPr marL="0" indent="0">
+              <a:lnSpc>
+                <a:spcPct val="150000"/>
+              </a:lnSpc>
+              <a:buNone/>
+            </a:pPr>
+            <a:r>
+              <a:rPr lang="en-US" sz="1800" dirty="0">
+                <a:hlinkClick r:id="rId2">
+                  <a:extLst>
+                    <a:ext uri="{A12FA001-AC4F-418D-AE19-62706E023703}">
+                      <ahyp:hlinkClr xmlns:ahyp="http://schemas.microsoft.com/office/drawing/2018/hyperlinkcolor" val="tx"/>
+                    </a:ext>
+                  </a:extLst>
+                </a:hlinkClick>
+              </a:rPr>
               <a:t>https://junit.org/junit5/docs</a:t>
             </a:r>
             <a:endParaRPr lang="en-US" sz="1800" dirty="0"/>
@@ -30607,31 +30627,7 @@
                   </a:extLst>
                 </a:hlinkClick>
               </a:rPr>
-              <a:t>https://javadoc.io/doc/org.mockito/</a:t>
-            </a:r>
-            <a:r>
-              <a:rPr lang="en-US" sz="1800" dirty="0">
-                <a:hlinkClick r:id="rId3">
-                  <a:extLst>
-                    <a:ext uri="{A12FA001-AC4F-418D-AE19-62706E023703}">
-                      <ahyp:hlinkClr xmlns:ahyp="http://schemas.microsoft.com/office/drawing/2018/hyperlinkcolor" val="tx"/>
-                    </a:ext>
-                  </a:extLst>
-                </a:hlinkClick>
-              </a:rPr>
-              <a:t>m</a:t>
-            </a:r>
-            <a:r>
-              <a:rPr lang="en-US" sz="1800" dirty="0">
-                <a:hlinkClick r:id="rId3">
-                  <a:extLst>
-                    <a:ext uri="{A12FA001-AC4F-418D-AE19-62706E023703}">
-                      <ahyp:hlinkClr xmlns:ahyp="http://schemas.microsoft.com/office/drawing/2018/hyperlinkcolor" val="tx"/>
-                    </a:ext>
-                  </a:extLst>
-                </a:hlinkClick>
-              </a:rPr>
-              <a:t>ockito-core/latest/org/mockito/Mockito.html</a:t>
+              <a:t>https://javadoc.io/doc/org.mockito/mockito-core/latest/org/mockito/Mockito.html</a:t>
             </a:r>
             <a:endParaRPr lang="en-US" sz="1800" dirty="0"/>
           </a:p>

</xml_diff>